<commit_message>
Adds ER diagram to slideset
</commit_message>
<xml_diff>
--- a/doc/shareboard.pptx
+++ b/doc/shareboard.pptx
@@ -64,9 +64,7 @@
           <a:noFill/>
         </a:ln>
         <a:solidFill>
-          <a:srgbClr val="86837F">
-            <a:alpha val="80000"/>
-          </a:srgbClr>
+          <a:srgbClr val="073E86"/>
         </a:solidFill>
         <a:effectLst>
           <a:outerShdw sx="100000" sy="100000" kx="0" ky="0" algn="b" rotWithShape="0" blurRad="25400" dist="12700" dir="5400000">
@@ -74,13 +72,13 @@
           </a:outerShdw>
         </a:effectLst>
         <a:uFillTx/>
-        <a:latin typeface="+mn-lt"/>
-        <a:ea typeface="+mn-ea"/>
-        <a:cs typeface="+mn-cs"/>
+        <a:latin typeface="Hoefler Text"/>
+        <a:ea typeface="Hoefler Text"/>
+        <a:cs typeface="Hoefler Text"/>
         <a:sym typeface="Hoefler Text"/>
       </a:defRPr>
     </a:lvl1pPr>
-    <a:lvl2pPr marL="0" marR="0" indent="228600" algn="ctr" defTabSz="584200" rtl="0" fontAlgn="auto" latinLnBrk="0" hangingPunct="0">
+    <a:lvl2pPr marL="0" marR="0" indent="0" algn="ctr" defTabSz="584200" rtl="0" fontAlgn="auto" latinLnBrk="0" hangingPunct="0">
       <a:lnSpc>
         <a:spcPct val="100000"/>
       </a:lnSpc>
@@ -100,9 +98,7 @@
           <a:noFill/>
         </a:ln>
         <a:solidFill>
-          <a:srgbClr val="86837F">
-            <a:alpha val="80000"/>
-          </a:srgbClr>
+          <a:srgbClr val="073E86"/>
         </a:solidFill>
         <a:effectLst>
           <a:outerShdw sx="100000" sy="100000" kx="0" ky="0" algn="b" rotWithShape="0" blurRad="25400" dist="12700" dir="5400000">
@@ -110,13 +106,13 @@
           </a:outerShdw>
         </a:effectLst>
         <a:uFillTx/>
-        <a:latin typeface="+mn-lt"/>
-        <a:ea typeface="+mn-ea"/>
-        <a:cs typeface="+mn-cs"/>
+        <a:latin typeface="Hoefler Text"/>
+        <a:ea typeface="Hoefler Text"/>
+        <a:cs typeface="Hoefler Text"/>
         <a:sym typeface="Hoefler Text"/>
       </a:defRPr>
     </a:lvl2pPr>
-    <a:lvl3pPr marL="0" marR="0" indent="457200" algn="ctr" defTabSz="584200" rtl="0" fontAlgn="auto" latinLnBrk="0" hangingPunct="0">
+    <a:lvl3pPr marL="0" marR="0" indent="0" algn="ctr" defTabSz="584200" rtl="0" fontAlgn="auto" latinLnBrk="0" hangingPunct="0">
       <a:lnSpc>
         <a:spcPct val="100000"/>
       </a:lnSpc>
@@ -136,9 +132,7 @@
           <a:noFill/>
         </a:ln>
         <a:solidFill>
-          <a:srgbClr val="86837F">
-            <a:alpha val="80000"/>
-          </a:srgbClr>
+          <a:srgbClr val="073E86"/>
         </a:solidFill>
         <a:effectLst>
           <a:outerShdw sx="100000" sy="100000" kx="0" ky="0" algn="b" rotWithShape="0" blurRad="25400" dist="12700" dir="5400000">
@@ -146,13 +140,13 @@
           </a:outerShdw>
         </a:effectLst>
         <a:uFillTx/>
-        <a:latin typeface="+mn-lt"/>
-        <a:ea typeface="+mn-ea"/>
-        <a:cs typeface="+mn-cs"/>
+        <a:latin typeface="Hoefler Text"/>
+        <a:ea typeface="Hoefler Text"/>
+        <a:cs typeface="Hoefler Text"/>
         <a:sym typeface="Hoefler Text"/>
       </a:defRPr>
     </a:lvl3pPr>
-    <a:lvl4pPr marL="0" marR="0" indent="685800" algn="ctr" defTabSz="584200" rtl="0" fontAlgn="auto" latinLnBrk="0" hangingPunct="0">
+    <a:lvl4pPr marL="0" marR="0" indent="0" algn="ctr" defTabSz="584200" rtl="0" fontAlgn="auto" latinLnBrk="0" hangingPunct="0">
       <a:lnSpc>
         <a:spcPct val="100000"/>
       </a:lnSpc>
@@ -172,9 +166,7 @@
           <a:noFill/>
         </a:ln>
         <a:solidFill>
-          <a:srgbClr val="86837F">
-            <a:alpha val="80000"/>
-          </a:srgbClr>
+          <a:srgbClr val="073E86"/>
         </a:solidFill>
         <a:effectLst>
           <a:outerShdw sx="100000" sy="100000" kx="0" ky="0" algn="b" rotWithShape="0" blurRad="25400" dist="12700" dir="5400000">
@@ -182,13 +174,13 @@
           </a:outerShdw>
         </a:effectLst>
         <a:uFillTx/>
-        <a:latin typeface="+mn-lt"/>
-        <a:ea typeface="+mn-ea"/>
-        <a:cs typeface="+mn-cs"/>
+        <a:latin typeface="Hoefler Text"/>
+        <a:ea typeface="Hoefler Text"/>
+        <a:cs typeface="Hoefler Text"/>
         <a:sym typeface="Hoefler Text"/>
       </a:defRPr>
     </a:lvl4pPr>
-    <a:lvl5pPr marL="0" marR="0" indent="914400" algn="ctr" defTabSz="584200" rtl="0" fontAlgn="auto" latinLnBrk="0" hangingPunct="0">
+    <a:lvl5pPr marL="0" marR="0" indent="0" algn="ctr" defTabSz="584200" rtl="0" fontAlgn="auto" latinLnBrk="0" hangingPunct="0">
       <a:lnSpc>
         <a:spcPct val="100000"/>
       </a:lnSpc>
@@ -208,9 +200,7 @@
           <a:noFill/>
         </a:ln>
         <a:solidFill>
-          <a:srgbClr val="86837F">
-            <a:alpha val="80000"/>
-          </a:srgbClr>
+          <a:srgbClr val="073E86"/>
         </a:solidFill>
         <a:effectLst>
           <a:outerShdw sx="100000" sy="100000" kx="0" ky="0" algn="b" rotWithShape="0" blurRad="25400" dist="12700" dir="5400000">
@@ -218,13 +208,13 @@
           </a:outerShdw>
         </a:effectLst>
         <a:uFillTx/>
-        <a:latin typeface="+mn-lt"/>
-        <a:ea typeface="+mn-ea"/>
-        <a:cs typeface="+mn-cs"/>
+        <a:latin typeface="Hoefler Text"/>
+        <a:ea typeface="Hoefler Text"/>
+        <a:cs typeface="Hoefler Text"/>
         <a:sym typeface="Hoefler Text"/>
       </a:defRPr>
     </a:lvl5pPr>
-    <a:lvl6pPr marL="0" marR="0" indent="1143000" algn="ctr" defTabSz="584200" rtl="0" fontAlgn="auto" latinLnBrk="0" hangingPunct="0">
+    <a:lvl6pPr marL="0" marR="0" indent="0" algn="ctr" defTabSz="584200" rtl="0" fontAlgn="auto" latinLnBrk="0" hangingPunct="0">
       <a:lnSpc>
         <a:spcPct val="100000"/>
       </a:lnSpc>
@@ -244,9 +234,7 @@
           <a:noFill/>
         </a:ln>
         <a:solidFill>
-          <a:srgbClr val="86837F">
-            <a:alpha val="80000"/>
-          </a:srgbClr>
+          <a:srgbClr val="073E86"/>
         </a:solidFill>
         <a:effectLst>
           <a:outerShdw sx="100000" sy="100000" kx="0" ky="0" algn="b" rotWithShape="0" blurRad="25400" dist="12700" dir="5400000">
@@ -254,13 +242,13 @@
           </a:outerShdw>
         </a:effectLst>
         <a:uFillTx/>
-        <a:latin typeface="+mn-lt"/>
-        <a:ea typeface="+mn-ea"/>
-        <a:cs typeface="+mn-cs"/>
+        <a:latin typeface="Hoefler Text"/>
+        <a:ea typeface="Hoefler Text"/>
+        <a:cs typeface="Hoefler Text"/>
         <a:sym typeface="Hoefler Text"/>
       </a:defRPr>
     </a:lvl6pPr>
-    <a:lvl7pPr marL="0" marR="0" indent="1371600" algn="ctr" defTabSz="584200" rtl="0" fontAlgn="auto" latinLnBrk="0" hangingPunct="0">
+    <a:lvl7pPr marL="0" marR="0" indent="0" algn="ctr" defTabSz="584200" rtl="0" fontAlgn="auto" latinLnBrk="0" hangingPunct="0">
       <a:lnSpc>
         <a:spcPct val="100000"/>
       </a:lnSpc>
@@ -280,9 +268,7 @@
           <a:noFill/>
         </a:ln>
         <a:solidFill>
-          <a:srgbClr val="86837F">
-            <a:alpha val="80000"/>
-          </a:srgbClr>
+          <a:srgbClr val="073E86"/>
         </a:solidFill>
         <a:effectLst>
           <a:outerShdw sx="100000" sy="100000" kx="0" ky="0" algn="b" rotWithShape="0" blurRad="25400" dist="12700" dir="5400000">
@@ -290,13 +276,13 @@
           </a:outerShdw>
         </a:effectLst>
         <a:uFillTx/>
-        <a:latin typeface="+mn-lt"/>
-        <a:ea typeface="+mn-ea"/>
-        <a:cs typeface="+mn-cs"/>
+        <a:latin typeface="Hoefler Text"/>
+        <a:ea typeface="Hoefler Text"/>
+        <a:cs typeface="Hoefler Text"/>
         <a:sym typeface="Hoefler Text"/>
       </a:defRPr>
     </a:lvl7pPr>
-    <a:lvl8pPr marL="0" marR="0" indent="1600200" algn="ctr" defTabSz="584200" rtl="0" fontAlgn="auto" latinLnBrk="0" hangingPunct="0">
+    <a:lvl8pPr marL="0" marR="0" indent="0" algn="ctr" defTabSz="584200" rtl="0" fontAlgn="auto" latinLnBrk="0" hangingPunct="0">
       <a:lnSpc>
         <a:spcPct val="100000"/>
       </a:lnSpc>
@@ -316,9 +302,7 @@
           <a:noFill/>
         </a:ln>
         <a:solidFill>
-          <a:srgbClr val="86837F">
-            <a:alpha val="80000"/>
-          </a:srgbClr>
+          <a:srgbClr val="073E86"/>
         </a:solidFill>
         <a:effectLst>
           <a:outerShdw sx="100000" sy="100000" kx="0" ky="0" algn="b" rotWithShape="0" blurRad="25400" dist="12700" dir="5400000">
@@ -326,13 +310,13 @@
           </a:outerShdw>
         </a:effectLst>
         <a:uFillTx/>
-        <a:latin typeface="+mn-lt"/>
-        <a:ea typeface="+mn-ea"/>
-        <a:cs typeface="+mn-cs"/>
+        <a:latin typeface="Hoefler Text"/>
+        <a:ea typeface="Hoefler Text"/>
+        <a:cs typeface="Hoefler Text"/>
         <a:sym typeface="Hoefler Text"/>
       </a:defRPr>
     </a:lvl8pPr>
-    <a:lvl9pPr marL="0" marR="0" indent="1828800" algn="ctr" defTabSz="584200" rtl="0" fontAlgn="auto" latinLnBrk="0" hangingPunct="0">
+    <a:lvl9pPr marL="0" marR="0" indent="0" algn="ctr" defTabSz="584200" rtl="0" fontAlgn="auto" latinLnBrk="0" hangingPunct="0">
       <a:lnSpc>
         <a:spcPct val="100000"/>
       </a:lnSpc>
@@ -352,9 +336,7 @@
           <a:noFill/>
         </a:ln>
         <a:solidFill>
-          <a:srgbClr val="86837F">
-            <a:alpha val="80000"/>
-          </a:srgbClr>
+          <a:srgbClr val="073E86"/>
         </a:solidFill>
         <a:effectLst>
           <a:outerShdw sx="100000" sy="100000" kx="0" ky="0" algn="b" rotWithShape="0" blurRad="25400" dist="12700" dir="5400000">
@@ -362,9 +344,9 @@
           </a:outerShdw>
         </a:effectLst>
         <a:uFillTx/>
-        <a:latin typeface="+mn-lt"/>
-        <a:ea typeface="+mn-ea"/>
-        <a:cs typeface="+mn-cs"/>
+        <a:latin typeface="Hoefler Text"/>
+        <a:ea typeface="Hoefler Text"/>
+        <a:cs typeface="Hoefler Text"/>
         <a:sym typeface="Hoefler Text"/>
       </a:defRPr>
     </a:lvl9pPr>
@@ -452,9 +434,9 @@
         <a:spcPct val="117999"/>
       </a:lnSpc>
       <a:defRPr sz="2200">
-        <a:latin typeface="Helvetica Neue"/>
-        <a:ea typeface="Helvetica Neue"/>
-        <a:cs typeface="Helvetica Neue"/>
+        <a:latin typeface="+mj-lt"/>
+        <a:ea typeface="+mj-ea"/>
+        <a:cs typeface="+mj-cs"/>
         <a:sym typeface="Helvetica Neue"/>
       </a:defRPr>
     </a:lvl1pPr>
@@ -463,9 +445,9 @@
         <a:spcPct val="117999"/>
       </a:lnSpc>
       <a:defRPr sz="2200">
-        <a:latin typeface="Helvetica Neue"/>
-        <a:ea typeface="Helvetica Neue"/>
-        <a:cs typeface="Helvetica Neue"/>
+        <a:latin typeface="+mj-lt"/>
+        <a:ea typeface="+mj-ea"/>
+        <a:cs typeface="+mj-cs"/>
         <a:sym typeface="Helvetica Neue"/>
       </a:defRPr>
     </a:lvl2pPr>
@@ -474,9 +456,9 @@
         <a:spcPct val="117999"/>
       </a:lnSpc>
       <a:defRPr sz="2200">
-        <a:latin typeface="Helvetica Neue"/>
-        <a:ea typeface="Helvetica Neue"/>
-        <a:cs typeface="Helvetica Neue"/>
+        <a:latin typeface="+mj-lt"/>
+        <a:ea typeface="+mj-ea"/>
+        <a:cs typeface="+mj-cs"/>
         <a:sym typeface="Helvetica Neue"/>
       </a:defRPr>
     </a:lvl3pPr>
@@ -485,9 +467,9 @@
         <a:spcPct val="117999"/>
       </a:lnSpc>
       <a:defRPr sz="2200">
-        <a:latin typeface="Helvetica Neue"/>
-        <a:ea typeface="Helvetica Neue"/>
-        <a:cs typeface="Helvetica Neue"/>
+        <a:latin typeface="+mj-lt"/>
+        <a:ea typeface="+mj-ea"/>
+        <a:cs typeface="+mj-cs"/>
         <a:sym typeface="Helvetica Neue"/>
       </a:defRPr>
     </a:lvl4pPr>
@@ -496,9 +478,9 @@
         <a:spcPct val="117999"/>
       </a:lnSpc>
       <a:defRPr sz="2200">
-        <a:latin typeface="Helvetica Neue"/>
-        <a:ea typeface="Helvetica Neue"/>
-        <a:cs typeface="Helvetica Neue"/>
+        <a:latin typeface="+mj-lt"/>
+        <a:ea typeface="+mj-ea"/>
+        <a:cs typeface="+mj-cs"/>
         <a:sym typeface="Helvetica Neue"/>
       </a:defRPr>
     </a:lvl5pPr>
@@ -507,9 +489,9 @@
         <a:spcPct val="117999"/>
       </a:lnSpc>
       <a:defRPr sz="2200">
-        <a:latin typeface="Helvetica Neue"/>
-        <a:ea typeface="Helvetica Neue"/>
-        <a:cs typeface="Helvetica Neue"/>
+        <a:latin typeface="+mj-lt"/>
+        <a:ea typeface="+mj-ea"/>
+        <a:cs typeface="+mj-cs"/>
         <a:sym typeface="Helvetica Neue"/>
       </a:defRPr>
     </a:lvl6pPr>
@@ -518,9 +500,9 @@
         <a:spcPct val="117999"/>
       </a:lnSpc>
       <a:defRPr sz="2200">
-        <a:latin typeface="Helvetica Neue"/>
-        <a:ea typeface="Helvetica Neue"/>
-        <a:cs typeface="Helvetica Neue"/>
+        <a:latin typeface="+mj-lt"/>
+        <a:ea typeface="+mj-ea"/>
+        <a:cs typeface="+mj-cs"/>
         <a:sym typeface="Helvetica Neue"/>
       </a:defRPr>
     </a:lvl7pPr>
@@ -529,9 +511,9 @@
         <a:spcPct val="117999"/>
       </a:lnSpc>
       <a:defRPr sz="2200">
-        <a:latin typeface="Helvetica Neue"/>
-        <a:ea typeface="Helvetica Neue"/>
-        <a:cs typeface="Helvetica Neue"/>
+        <a:latin typeface="+mj-lt"/>
+        <a:ea typeface="+mj-ea"/>
+        <a:cs typeface="+mj-cs"/>
         <a:sym typeface="Helvetica Neue"/>
       </a:defRPr>
     </a:lvl8pPr>
@@ -540,9 +522,9 @@
         <a:spcPct val="117999"/>
       </a:lnSpc>
       <a:defRPr sz="2200">
-        <a:latin typeface="Helvetica Neue"/>
-        <a:ea typeface="Helvetica Neue"/>
-        <a:cs typeface="Helvetica Neue"/>
+        <a:latin typeface="+mj-lt"/>
+        <a:ea typeface="+mj-ea"/>
+        <a:cs typeface="+mj-cs"/>
         <a:sym typeface="Helvetica Neue"/>
       </a:defRPr>
     </a:lvl9pPr>
@@ -623,6 +605,11 @@
           <a:prstGeom prst="rect">
             <a:avLst/>
           </a:prstGeom>
+          <a:extLst>
+            <a:ext uri="{C572A759-6A51-4108-AA02-DFA0A04FC94B}">
+              <ma14:wrappingTextBoxFlag xmlns:ma14="http://schemas.microsoft.com/office/mac/drawingml/2011/main" val="1"/>
+            </a:ext>
+          </a:extLst>
         </p:spPr>
         <p:txBody>
           <a:bodyPr anchor="b"/>
@@ -689,7 +676,7 @@
                 </a:effectLst>
               </a:defRPr>
             </a:lvl1pPr>
-            <a:lvl2pPr marL="0" indent="228600" algn="ctr">
+            <a:lvl2pPr marL="0" indent="0" algn="ctr">
               <a:spcBef>
                 <a:spcPts val="0"/>
               </a:spcBef>
@@ -708,7 +695,7 @@
                 </a:effectLst>
               </a:defRPr>
             </a:lvl2pPr>
-            <a:lvl3pPr marL="0" indent="457200" algn="ctr">
+            <a:lvl3pPr marL="0" indent="0" algn="ctr">
               <a:spcBef>
                 <a:spcPts val="0"/>
               </a:spcBef>
@@ -727,7 +714,7 @@
                 </a:effectLst>
               </a:defRPr>
             </a:lvl3pPr>
-            <a:lvl4pPr marL="0" indent="685800" algn="ctr">
+            <a:lvl4pPr marL="0" indent="0" algn="ctr">
               <a:spcBef>
                 <a:spcPts val="0"/>
               </a:spcBef>
@@ -746,7 +733,7 @@
                 </a:effectLst>
               </a:defRPr>
             </a:lvl4pPr>
-            <a:lvl5pPr marL="0" indent="914400" algn="ctr">
+            <a:lvl5pPr marL="0" indent="0" algn="ctr">
               <a:spcBef>
                 <a:spcPts val="0"/>
               </a:spcBef>
@@ -859,7 +846,7 @@
           <p:cNvPr id="94" name="Shape 94"/>
           <p:cNvSpPr/>
           <p:nvPr>
-            <p:ph type="body" sz="quarter" idx="13"/>
+            <p:ph type="body" sz="quarter" idx="1"/>
           </p:nvPr>
         </p:nvSpPr>
         <p:spPr>
@@ -872,9 +859,7 @@
           </a:prstGeom>
         </p:spPr>
         <p:txBody>
-          <a:bodyPr anchor="t">
-            <a:spAutoFit/>
-          </a:bodyPr>
+          <a:bodyPr anchor="t"/>
           <a:lstStyle>
             <a:lvl1pPr marL="0" indent="0" algn="ctr">
               <a:lnSpc>
@@ -901,7 +886,7 @@
           <p:cNvPr id="95" name="Shape 95"/>
           <p:cNvSpPr/>
           <p:nvPr>
-            <p:ph type="body" sz="quarter" idx="14"/>
+            <p:ph type="body" sz="quarter" idx="13"/>
           </p:nvPr>
         </p:nvSpPr>
         <p:spPr>
@@ -914,11 +899,10 @@
           </a:prstGeom>
         </p:spPr>
         <p:txBody>
-          <a:bodyPr>
-            <a:spAutoFit/>
-          </a:bodyPr>
-          <a:lstStyle>
-            <a:lvl1pPr marL="0" indent="0" algn="ctr">
+          <a:bodyPr/>
+          <a:lstStyle/>
+          <a:p>
+            <a:pPr marL="0" indent="0" algn="ctr">
               <a:lnSpc>
                 <a:spcPct val="100000"/>
               </a:lnSpc>
@@ -927,13 +911,7 @@
               </a:spcBef>
               <a:buSzTx/>
               <a:buNone/>
-            </a:lvl1pPr>
-          </a:lstStyle>
-          <a:p>
-            <a:pPr/>
-            <a:r>
-              <a:t>“Type a quote here.”</a:t>
-            </a:r>
+            </a:pPr>
           </a:p>
         </p:txBody>
       </p:sp>
@@ -1135,9 +1113,6 @@
           <a:prstGeom prst="rect">
             <a:avLst/>
           </a:prstGeom>
-          <a:ln w="9525">
-            <a:round/>
-          </a:ln>
         </p:spPr>
         <p:txBody>
           <a:bodyPr lIns="91439" tIns="45719" rIns="91439" bIns="45719" anchor="t">
@@ -1165,6 +1140,11 @@
           <a:prstGeom prst="rect">
             <a:avLst/>
           </a:prstGeom>
+          <a:extLst>
+            <a:ext uri="{C572A759-6A51-4108-AA02-DFA0A04FC94B}">
+              <ma14:wrappingTextBoxFlag xmlns:ma14="http://schemas.microsoft.com/office/mac/drawingml/2011/main" val="1"/>
+            </a:ext>
+          </a:extLst>
         </p:spPr>
         <p:txBody>
           <a:bodyPr/>
@@ -1231,7 +1211,7 @@
                 </a:effectLst>
               </a:defRPr>
             </a:lvl1pPr>
-            <a:lvl2pPr marL="0" indent="228600" algn="ctr">
+            <a:lvl2pPr marL="0" indent="0" algn="ctr">
               <a:spcBef>
                 <a:spcPts val="0"/>
               </a:spcBef>
@@ -1250,7 +1230,7 @@
                 </a:effectLst>
               </a:defRPr>
             </a:lvl2pPr>
-            <a:lvl3pPr marL="0" indent="457200" algn="ctr">
+            <a:lvl3pPr marL="0" indent="0" algn="ctr">
               <a:spcBef>
                 <a:spcPts val="0"/>
               </a:spcBef>
@@ -1269,7 +1249,7 @@
                 </a:effectLst>
               </a:defRPr>
             </a:lvl3pPr>
-            <a:lvl4pPr marL="0" indent="685800" algn="ctr">
+            <a:lvl4pPr marL="0" indent="0" algn="ctr">
               <a:spcBef>
                 <a:spcPts val="0"/>
               </a:spcBef>
@@ -1288,7 +1268,7 @@
                 </a:effectLst>
               </a:defRPr>
             </a:lvl4pPr>
-            <a:lvl5pPr marL="0" indent="914400" algn="ctr">
+            <a:lvl5pPr marL="0" indent="0" algn="ctr">
               <a:spcBef>
                 <a:spcPts val="0"/>
               </a:spcBef>
@@ -1412,6 +1392,11 @@
           <a:prstGeom prst="rect">
             <a:avLst/>
           </a:prstGeom>
+          <a:extLst>
+            <a:ext uri="{C572A759-6A51-4108-AA02-DFA0A04FC94B}">
+              <ma14:wrappingTextBoxFlag xmlns:ma14="http://schemas.microsoft.com/office/mac/drawingml/2011/main" val="1"/>
+            </a:ext>
+          </a:extLst>
         </p:spPr>
         <p:txBody>
           <a:bodyPr/>
@@ -1488,9 +1473,6 @@
           <a:prstGeom prst="rect">
             <a:avLst/>
           </a:prstGeom>
-          <a:ln w="9525">
-            <a:round/>
-          </a:ln>
         </p:spPr>
         <p:txBody>
           <a:bodyPr lIns="91439" tIns="45719" rIns="91439" bIns="45719" anchor="t">
@@ -1518,6 +1500,11 @@
           <a:prstGeom prst="rect">
             <a:avLst/>
           </a:prstGeom>
+          <a:extLst>
+            <a:ext uri="{C572A759-6A51-4108-AA02-DFA0A04FC94B}">
+              <ma14:wrappingTextBoxFlag xmlns:ma14="http://schemas.microsoft.com/office/mac/drawingml/2011/main" val="1"/>
+            </a:ext>
+          </a:extLst>
         </p:spPr>
         <p:txBody>
           <a:bodyPr anchor="b"/>
@@ -1558,7 +1545,7 @@
               <a:buNone/>
               <a:defRPr sz="3600"/>
             </a:lvl1pPr>
-            <a:lvl2pPr marL="0" indent="228600" algn="ctr">
+            <a:lvl2pPr marL="0" indent="0" algn="ctr">
               <a:spcBef>
                 <a:spcPts val="0"/>
               </a:spcBef>
@@ -1566,7 +1553,7 @@
               <a:buNone/>
               <a:defRPr sz="3600"/>
             </a:lvl2pPr>
-            <a:lvl3pPr marL="0" indent="457200" algn="ctr">
+            <a:lvl3pPr marL="0" indent="0" algn="ctr">
               <a:spcBef>
                 <a:spcPts val="0"/>
               </a:spcBef>
@@ -1574,7 +1561,7 @@
               <a:buNone/>
               <a:defRPr sz="3600"/>
             </a:lvl3pPr>
-            <a:lvl4pPr marL="0" indent="685800" algn="ctr">
+            <a:lvl4pPr marL="0" indent="0" algn="ctr">
               <a:spcBef>
                 <a:spcPts val="0"/>
               </a:spcBef>
@@ -1582,7 +1569,7 @@
               <a:buNone/>
               <a:defRPr sz="3600"/>
             </a:lvl4pPr>
-            <a:lvl5pPr marL="0" indent="914400" algn="ctr">
+            <a:lvl5pPr marL="0" indent="0" algn="ctr">
               <a:spcBef>
                 <a:spcPts val="0"/>
               </a:spcBef>
@@ -1691,9 +1678,18 @@
           </p:nvPr>
         </p:nvSpPr>
         <p:spPr>
+          <a:xfrm>
+            <a:off x="1270000" y="749300"/>
+            <a:ext cx="10464800" cy="1651000"/>
+          </a:xfrm>
           <a:prstGeom prst="rect">
             <a:avLst/>
           </a:prstGeom>
+          <a:extLst>
+            <a:ext uri="{C572A759-6A51-4108-AA02-DFA0A04FC94B}">
+              <ma14:wrappingTextBoxFlag xmlns:ma14="http://schemas.microsoft.com/office/mac/drawingml/2011/main" val="1"/>
+            </a:ext>
+          </a:extLst>
         </p:spPr>
         <p:txBody>
           <a:bodyPr/>
@@ -1774,9 +1770,18 @@
           </p:nvPr>
         </p:nvSpPr>
         <p:spPr>
+          <a:xfrm>
+            <a:off x="1270000" y="749300"/>
+            <a:ext cx="10464800" cy="1651000"/>
+          </a:xfrm>
           <a:prstGeom prst="rect">
             <a:avLst/>
           </a:prstGeom>
+          <a:extLst>
+            <a:ext uri="{C572A759-6A51-4108-AA02-DFA0A04FC94B}">
+              <ma14:wrappingTextBoxFlag xmlns:ma14="http://schemas.microsoft.com/office/mac/drawingml/2011/main" val="1"/>
+            </a:ext>
+          </a:extLst>
         </p:spPr>
         <p:txBody>
           <a:bodyPr/>
@@ -1962,9 +1967,6 @@
           <a:prstGeom prst="rect">
             <a:avLst/>
           </a:prstGeom>
-          <a:ln w="9525">
-            <a:round/>
-          </a:ln>
         </p:spPr>
         <p:txBody>
           <a:bodyPr lIns="91439" tIns="45719" rIns="91439" bIns="45719" anchor="t">
@@ -1985,9 +1987,18 @@
           </p:nvPr>
         </p:nvSpPr>
         <p:spPr>
+          <a:xfrm>
+            <a:off x="1270000" y="749300"/>
+            <a:ext cx="10464800" cy="1651000"/>
+          </a:xfrm>
           <a:prstGeom prst="rect">
             <a:avLst/>
           </a:prstGeom>
+          <a:extLst>
+            <a:ext uri="{C572A759-6A51-4108-AA02-DFA0A04FC94B}">
+              <ma14:wrappingTextBoxFlag xmlns:ma14="http://schemas.microsoft.com/office/mac/drawingml/2011/main" val="1"/>
+            </a:ext>
+          </a:extLst>
         </p:spPr>
         <p:txBody>
           <a:bodyPr/>
@@ -2278,15 +2289,12 @@
         </p:nvSpPr>
         <p:spPr>
           <a:xfrm>
-            <a:off x="6719758" y="4990857"/>
-            <a:ext cx="5410201" cy="3810001"/>
+            <a:off x="6719758" y="4990856"/>
+            <a:ext cx="5410202" cy="3810003"/>
           </a:xfrm>
           <a:prstGeom prst="rect">
             <a:avLst/>
           </a:prstGeom>
-          <a:ln w="9525">
-            <a:round/>
-          </a:ln>
         </p:spPr>
         <p:txBody>
           <a:bodyPr lIns="91439" tIns="45719" rIns="91439" bIns="45719" anchor="t">
@@ -2308,15 +2316,12 @@
         </p:nvSpPr>
         <p:spPr>
           <a:xfrm>
-            <a:off x="6719758" y="939557"/>
-            <a:ext cx="5410201" cy="3810001"/>
+            <a:off x="6719758" y="939556"/>
+            <a:ext cx="5410202" cy="3810003"/>
           </a:xfrm>
           <a:prstGeom prst="rect">
             <a:avLst/>
           </a:prstGeom>
-          <a:ln w="9525">
-            <a:round/>
-          </a:ln>
         </p:spPr>
         <p:txBody>
           <a:bodyPr lIns="91439" tIns="45719" rIns="91439" bIns="45719" anchor="t">
@@ -2338,15 +2343,12 @@
         </p:nvSpPr>
         <p:spPr>
           <a:xfrm>
-            <a:off x="979663" y="939800"/>
-            <a:ext cx="5499101" cy="7861300"/>
+            <a:off x="979662" y="939800"/>
+            <a:ext cx="5499103" cy="7861300"/>
           </a:xfrm>
           <a:prstGeom prst="rect">
             <a:avLst/>
           </a:prstGeom>
-          <a:ln w="9525">
-            <a:round/>
-          </a:ln>
         </p:spPr>
         <p:txBody>
           <a:bodyPr lIns="91439" tIns="45719" rIns="91439" bIns="45719" anchor="t">
@@ -2515,8 +2517,8 @@
         </p:nvSpPr>
         <p:spPr>
           <a:xfrm>
-            <a:off x="1270000" y="749300"/>
-            <a:ext cx="10464800" cy="1651000"/>
+            <a:off x="1948462" y="1950720"/>
+            <a:ext cx="10403841" cy="661529"/>
           </a:xfrm>
           <a:prstGeom prst="rect">
             <a:avLst/>
@@ -2524,11 +2526,6 @@
           <a:ln w="12700">
             <a:miter lim="400000"/>
           </a:ln>
-          <a:extLst>
-            <a:ext uri="{C572A759-6A51-4108-AA02-DFA0A04FC94B}">
-              <ma14:wrappingTextBoxFlag xmlns:ma14="http://schemas.microsoft.com/office/mac/drawingml/2011/main" val="1"/>
-            </a:ext>
-          </a:extLst>
         </p:spPr>
         <p:txBody>
           <a:bodyPr lIns="50800" tIns="50800" rIns="50800" bIns="50800" anchor="ctr">
@@ -2537,9 +2534,6 @@
           <a:lstStyle/>
           <a:p>
             <a:pPr/>
-            <a:r>
-              <a:t>Title Text</a:t>
-            </a:r>
           </a:p>
         </p:txBody>
       </p:sp>
@@ -2643,13 +2637,13 @@
             </a:outerShdw>
           </a:effectLst>
           <a:uFillTx/>
-          <a:latin typeface="+mn-lt"/>
-          <a:ea typeface="+mn-ea"/>
-          <a:cs typeface="+mn-cs"/>
+          <a:latin typeface="Hoefler Text"/>
+          <a:ea typeface="Hoefler Text"/>
+          <a:cs typeface="Hoefler Text"/>
           <a:sym typeface="Hoefler Text"/>
         </a:defRPr>
       </a:lvl1pPr>
-      <a:lvl2pPr marL="0" marR="0" indent="228600" algn="ctr" defTabSz="584200" rtl="0" latinLnBrk="0">
+      <a:lvl2pPr marL="0" marR="0" indent="0" algn="ctr" defTabSz="584200" rtl="0" latinLnBrk="0">
         <a:lnSpc>
           <a:spcPct val="100000"/>
         </a:lnSpc>
@@ -2679,13 +2673,13 @@
             </a:outerShdw>
           </a:effectLst>
           <a:uFillTx/>
-          <a:latin typeface="+mn-lt"/>
-          <a:ea typeface="+mn-ea"/>
-          <a:cs typeface="+mn-cs"/>
+          <a:latin typeface="Hoefler Text"/>
+          <a:ea typeface="Hoefler Text"/>
+          <a:cs typeface="Hoefler Text"/>
           <a:sym typeface="Hoefler Text"/>
         </a:defRPr>
       </a:lvl2pPr>
-      <a:lvl3pPr marL="0" marR="0" indent="457200" algn="ctr" defTabSz="584200" rtl="0" latinLnBrk="0">
+      <a:lvl3pPr marL="0" marR="0" indent="0" algn="ctr" defTabSz="584200" rtl="0" latinLnBrk="0">
         <a:lnSpc>
           <a:spcPct val="100000"/>
         </a:lnSpc>
@@ -2715,13 +2709,13 @@
             </a:outerShdw>
           </a:effectLst>
           <a:uFillTx/>
-          <a:latin typeface="+mn-lt"/>
-          <a:ea typeface="+mn-ea"/>
-          <a:cs typeface="+mn-cs"/>
+          <a:latin typeface="Hoefler Text"/>
+          <a:ea typeface="Hoefler Text"/>
+          <a:cs typeface="Hoefler Text"/>
           <a:sym typeface="Hoefler Text"/>
         </a:defRPr>
       </a:lvl3pPr>
-      <a:lvl4pPr marL="0" marR="0" indent="685800" algn="ctr" defTabSz="584200" rtl="0" latinLnBrk="0">
+      <a:lvl4pPr marL="0" marR="0" indent="0" algn="ctr" defTabSz="584200" rtl="0" latinLnBrk="0">
         <a:lnSpc>
           <a:spcPct val="100000"/>
         </a:lnSpc>
@@ -2751,13 +2745,13 @@
             </a:outerShdw>
           </a:effectLst>
           <a:uFillTx/>
-          <a:latin typeface="+mn-lt"/>
-          <a:ea typeface="+mn-ea"/>
-          <a:cs typeface="+mn-cs"/>
+          <a:latin typeface="Hoefler Text"/>
+          <a:ea typeface="Hoefler Text"/>
+          <a:cs typeface="Hoefler Text"/>
           <a:sym typeface="Hoefler Text"/>
         </a:defRPr>
       </a:lvl4pPr>
-      <a:lvl5pPr marL="0" marR="0" indent="914400" algn="ctr" defTabSz="584200" rtl="0" latinLnBrk="0">
+      <a:lvl5pPr marL="0" marR="0" indent="0" algn="ctr" defTabSz="584200" rtl="0" latinLnBrk="0">
         <a:lnSpc>
           <a:spcPct val="100000"/>
         </a:lnSpc>
@@ -2787,13 +2781,13 @@
             </a:outerShdw>
           </a:effectLst>
           <a:uFillTx/>
-          <a:latin typeface="+mn-lt"/>
-          <a:ea typeface="+mn-ea"/>
-          <a:cs typeface="+mn-cs"/>
+          <a:latin typeface="Hoefler Text"/>
+          <a:ea typeface="Hoefler Text"/>
+          <a:cs typeface="Hoefler Text"/>
           <a:sym typeface="Hoefler Text"/>
         </a:defRPr>
       </a:lvl5pPr>
-      <a:lvl6pPr marL="0" marR="0" indent="1143000" algn="ctr" defTabSz="584200" rtl="0" latinLnBrk="0">
+      <a:lvl6pPr marL="0" marR="0" indent="0" algn="ctr" defTabSz="584200" rtl="0" latinLnBrk="0">
         <a:lnSpc>
           <a:spcPct val="100000"/>
         </a:lnSpc>
@@ -2823,13 +2817,13 @@
             </a:outerShdw>
           </a:effectLst>
           <a:uFillTx/>
-          <a:latin typeface="+mn-lt"/>
-          <a:ea typeface="+mn-ea"/>
-          <a:cs typeface="+mn-cs"/>
+          <a:latin typeface="Hoefler Text"/>
+          <a:ea typeface="Hoefler Text"/>
+          <a:cs typeface="Hoefler Text"/>
           <a:sym typeface="Hoefler Text"/>
         </a:defRPr>
       </a:lvl6pPr>
-      <a:lvl7pPr marL="0" marR="0" indent="1371600" algn="ctr" defTabSz="584200" rtl="0" latinLnBrk="0">
+      <a:lvl7pPr marL="0" marR="0" indent="0" algn="ctr" defTabSz="584200" rtl="0" latinLnBrk="0">
         <a:lnSpc>
           <a:spcPct val="100000"/>
         </a:lnSpc>
@@ -2859,13 +2853,13 @@
             </a:outerShdw>
           </a:effectLst>
           <a:uFillTx/>
-          <a:latin typeface="+mn-lt"/>
-          <a:ea typeface="+mn-ea"/>
-          <a:cs typeface="+mn-cs"/>
+          <a:latin typeface="Hoefler Text"/>
+          <a:ea typeface="Hoefler Text"/>
+          <a:cs typeface="Hoefler Text"/>
           <a:sym typeface="Hoefler Text"/>
         </a:defRPr>
       </a:lvl7pPr>
-      <a:lvl8pPr marL="0" marR="0" indent="1600200" algn="ctr" defTabSz="584200" rtl="0" latinLnBrk="0">
+      <a:lvl8pPr marL="0" marR="0" indent="0" algn="ctr" defTabSz="584200" rtl="0" latinLnBrk="0">
         <a:lnSpc>
           <a:spcPct val="100000"/>
         </a:lnSpc>
@@ -2895,13 +2889,13 @@
             </a:outerShdw>
           </a:effectLst>
           <a:uFillTx/>
-          <a:latin typeface="+mn-lt"/>
-          <a:ea typeface="+mn-ea"/>
-          <a:cs typeface="+mn-cs"/>
+          <a:latin typeface="Hoefler Text"/>
+          <a:ea typeface="Hoefler Text"/>
+          <a:cs typeface="Hoefler Text"/>
           <a:sym typeface="Hoefler Text"/>
         </a:defRPr>
       </a:lvl8pPr>
-      <a:lvl9pPr marL="0" marR="0" indent="1828800" algn="ctr" defTabSz="584200" rtl="0" latinLnBrk="0">
+      <a:lvl9pPr marL="0" marR="0" indent="0" algn="ctr" defTabSz="584200" rtl="0" latinLnBrk="0">
         <a:lnSpc>
           <a:spcPct val="100000"/>
         </a:lnSpc>
@@ -2931,9 +2925,9 @@
             </a:outerShdw>
           </a:effectLst>
           <a:uFillTx/>
-          <a:latin typeface="+mn-lt"/>
-          <a:ea typeface="+mn-ea"/>
-          <a:cs typeface="+mn-cs"/>
+          <a:latin typeface="Hoefler Text"/>
+          <a:ea typeface="Hoefler Text"/>
+          <a:cs typeface="Hoefler Text"/>
           <a:sym typeface="Hoefler Text"/>
         </a:defRPr>
       </a:lvl9pPr>
@@ -2971,9 +2965,9 @@
             </a:outerShdw>
           </a:effectLst>
           <a:uFillTx/>
-          <a:latin typeface="+mn-lt"/>
-          <a:ea typeface="+mn-ea"/>
-          <a:cs typeface="+mn-cs"/>
+          <a:latin typeface="Hoefler Text"/>
+          <a:ea typeface="Hoefler Text"/>
+          <a:cs typeface="Hoefler Text"/>
           <a:sym typeface="Hoefler Text"/>
         </a:defRPr>
       </a:lvl1pPr>
@@ -3009,9 +3003,9 @@
             </a:outerShdw>
           </a:effectLst>
           <a:uFillTx/>
-          <a:latin typeface="+mn-lt"/>
-          <a:ea typeface="+mn-ea"/>
-          <a:cs typeface="+mn-cs"/>
+          <a:latin typeface="Hoefler Text"/>
+          <a:ea typeface="Hoefler Text"/>
+          <a:cs typeface="Hoefler Text"/>
           <a:sym typeface="Hoefler Text"/>
         </a:defRPr>
       </a:lvl2pPr>
@@ -3047,9 +3041,9 @@
             </a:outerShdw>
           </a:effectLst>
           <a:uFillTx/>
-          <a:latin typeface="+mn-lt"/>
-          <a:ea typeface="+mn-ea"/>
-          <a:cs typeface="+mn-cs"/>
+          <a:latin typeface="Hoefler Text"/>
+          <a:ea typeface="Hoefler Text"/>
+          <a:cs typeface="Hoefler Text"/>
           <a:sym typeface="Hoefler Text"/>
         </a:defRPr>
       </a:lvl3pPr>
@@ -3085,9 +3079,9 @@
             </a:outerShdw>
           </a:effectLst>
           <a:uFillTx/>
-          <a:latin typeface="+mn-lt"/>
-          <a:ea typeface="+mn-ea"/>
-          <a:cs typeface="+mn-cs"/>
+          <a:latin typeface="Hoefler Text"/>
+          <a:ea typeface="Hoefler Text"/>
+          <a:cs typeface="Hoefler Text"/>
           <a:sym typeface="Hoefler Text"/>
         </a:defRPr>
       </a:lvl4pPr>
@@ -3123,9 +3117,9 @@
             </a:outerShdw>
           </a:effectLst>
           <a:uFillTx/>
-          <a:latin typeface="+mn-lt"/>
-          <a:ea typeface="+mn-ea"/>
-          <a:cs typeface="+mn-cs"/>
+          <a:latin typeface="Hoefler Text"/>
+          <a:ea typeface="Hoefler Text"/>
+          <a:cs typeface="Hoefler Text"/>
           <a:sym typeface="Hoefler Text"/>
         </a:defRPr>
       </a:lvl5pPr>
@@ -3161,9 +3155,9 @@
             </a:outerShdw>
           </a:effectLst>
           <a:uFillTx/>
-          <a:latin typeface="+mn-lt"/>
-          <a:ea typeface="+mn-ea"/>
-          <a:cs typeface="+mn-cs"/>
+          <a:latin typeface="Hoefler Text"/>
+          <a:ea typeface="Hoefler Text"/>
+          <a:cs typeface="Hoefler Text"/>
           <a:sym typeface="Hoefler Text"/>
         </a:defRPr>
       </a:lvl6pPr>
@@ -3199,9 +3193,9 @@
             </a:outerShdw>
           </a:effectLst>
           <a:uFillTx/>
-          <a:latin typeface="+mn-lt"/>
-          <a:ea typeface="+mn-ea"/>
-          <a:cs typeface="+mn-cs"/>
+          <a:latin typeface="Hoefler Text"/>
+          <a:ea typeface="Hoefler Text"/>
+          <a:cs typeface="Hoefler Text"/>
           <a:sym typeface="Hoefler Text"/>
         </a:defRPr>
       </a:lvl7pPr>
@@ -3237,9 +3231,9 @@
             </a:outerShdw>
           </a:effectLst>
           <a:uFillTx/>
-          <a:latin typeface="+mn-lt"/>
-          <a:ea typeface="+mn-ea"/>
-          <a:cs typeface="+mn-cs"/>
+          <a:latin typeface="Hoefler Text"/>
+          <a:ea typeface="Hoefler Text"/>
+          <a:cs typeface="Hoefler Text"/>
           <a:sym typeface="Hoefler Text"/>
         </a:defRPr>
       </a:lvl8pPr>
@@ -3275,9 +3269,9 @@
             </a:outerShdw>
           </a:effectLst>
           <a:uFillTx/>
-          <a:latin typeface="+mn-lt"/>
-          <a:ea typeface="+mn-ea"/>
-          <a:cs typeface="+mn-cs"/>
+          <a:latin typeface="Hoefler Text"/>
+          <a:ea typeface="Hoefler Text"/>
+          <a:cs typeface="Hoefler Text"/>
           <a:sym typeface="Hoefler Text"/>
         </a:defRPr>
       </a:lvl9pPr>
@@ -3319,7 +3313,7 @@
           <a:sym typeface="Palatino"/>
         </a:defRPr>
       </a:lvl1pPr>
-      <a:lvl2pPr marL="0" marR="0" indent="228600" algn="ctr" defTabSz="584200" rtl="0" latinLnBrk="0">
+      <a:lvl2pPr marL="0" marR="0" indent="0" algn="ctr" defTabSz="584200" rtl="0" latinLnBrk="0">
         <a:lnSpc>
           <a:spcPct val="100000"/>
         </a:lnSpc>
@@ -3355,7 +3349,7 @@
           <a:sym typeface="Palatino"/>
         </a:defRPr>
       </a:lvl2pPr>
-      <a:lvl3pPr marL="0" marR="0" indent="457200" algn="ctr" defTabSz="584200" rtl="0" latinLnBrk="0">
+      <a:lvl3pPr marL="0" marR="0" indent="0" algn="ctr" defTabSz="584200" rtl="0" latinLnBrk="0">
         <a:lnSpc>
           <a:spcPct val="100000"/>
         </a:lnSpc>
@@ -3391,7 +3385,7 @@
           <a:sym typeface="Palatino"/>
         </a:defRPr>
       </a:lvl3pPr>
-      <a:lvl4pPr marL="0" marR="0" indent="685800" algn="ctr" defTabSz="584200" rtl="0" latinLnBrk="0">
+      <a:lvl4pPr marL="0" marR="0" indent="0" algn="ctr" defTabSz="584200" rtl="0" latinLnBrk="0">
         <a:lnSpc>
           <a:spcPct val="100000"/>
         </a:lnSpc>
@@ -3427,7 +3421,7 @@
           <a:sym typeface="Palatino"/>
         </a:defRPr>
       </a:lvl4pPr>
-      <a:lvl5pPr marL="0" marR="0" indent="914400" algn="ctr" defTabSz="584200" rtl="0" latinLnBrk="0">
+      <a:lvl5pPr marL="0" marR="0" indent="0" algn="ctr" defTabSz="584200" rtl="0" latinLnBrk="0">
         <a:lnSpc>
           <a:spcPct val="100000"/>
         </a:lnSpc>
@@ -3463,7 +3457,7 @@
           <a:sym typeface="Palatino"/>
         </a:defRPr>
       </a:lvl5pPr>
-      <a:lvl6pPr marL="0" marR="0" indent="1143000" algn="ctr" defTabSz="584200" rtl="0" latinLnBrk="0">
+      <a:lvl6pPr marL="0" marR="0" indent="0" algn="ctr" defTabSz="584200" rtl="0" latinLnBrk="0">
         <a:lnSpc>
           <a:spcPct val="100000"/>
         </a:lnSpc>
@@ -3499,7 +3493,7 @@
           <a:sym typeface="Palatino"/>
         </a:defRPr>
       </a:lvl6pPr>
-      <a:lvl7pPr marL="0" marR="0" indent="1371600" algn="ctr" defTabSz="584200" rtl="0" latinLnBrk="0">
+      <a:lvl7pPr marL="0" marR="0" indent="0" algn="ctr" defTabSz="584200" rtl="0" latinLnBrk="0">
         <a:lnSpc>
           <a:spcPct val="100000"/>
         </a:lnSpc>
@@ -3535,7 +3529,7 @@
           <a:sym typeface="Palatino"/>
         </a:defRPr>
       </a:lvl7pPr>
-      <a:lvl8pPr marL="0" marR="0" indent="1600200" algn="ctr" defTabSz="584200" rtl="0" latinLnBrk="0">
+      <a:lvl8pPr marL="0" marR="0" indent="0" algn="ctr" defTabSz="584200" rtl="0" latinLnBrk="0">
         <a:lnSpc>
           <a:spcPct val="100000"/>
         </a:lnSpc>
@@ -3571,7 +3565,7 @@
           <a:sym typeface="Palatino"/>
         </a:defRPr>
       </a:lvl8pPr>
-      <a:lvl9pPr marL="0" marR="0" indent="1828800" algn="ctr" defTabSz="584200" rtl="0" latinLnBrk="0">
+      <a:lvl9pPr marL="0" marR="0" indent="0" algn="ctr" defTabSz="584200" rtl="0" latinLnBrk="0">
         <a:lnSpc>
           <a:spcPct val="100000"/>
         </a:lnSpc>
@@ -3705,9 +3699,9 @@
       </p:grpSpPr>
       <p:pic>
         <p:nvPicPr>
-          <p:cNvPr id="123" name=""/>
+          <p:cNvPr id="123" name="image5-small.png"/>
           <p:cNvPicPr>
-            <a:picLocks noChangeAspect="0"/>
+            <a:picLocks noChangeAspect="1"/>
           </p:cNvPicPr>
           <p:nvPr>
             <p:ph type="pic" idx="13"/>
@@ -3717,72 +3711,21 @@
           <a:blip r:embed="rId2">
             <a:extLst/>
           </a:blip>
+          <a:srcRect l="585" t="0" r="585" b="0"/>
           <a:stretch>
             <a:fillRect/>
           </a:stretch>
         </p:blipFill>
         <p:spPr>
           <a:xfrm>
-            <a:off x="2222500" y="787400"/>
-            <a:ext cx="8559800" cy="5854700"/>
+            <a:off x="-432362" y="-990638"/>
+            <a:ext cx="13869629" cy="10402224"/>
           </a:xfrm>
           <a:prstGeom prst="rect">
             <a:avLst/>
           </a:prstGeom>
         </p:spPr>
       </p:pic>
-      <p:sp>
-        <p:nvSpPr>
-          <p:cNvPr id="124" name="Shape 124"/>
-          <p:cNvSpPr/>
-          <p:nvPr>
-            <p:ph type="title"/>
-          </p:nvPr>
-        </p:nvSpPr>
-        <p:spPr>
-          <a:prstGeom prst="rect">
-            <a:avLst/>
-          </a:prstGeom>
-        </p:spPr>
-        <p:txBody>
-          <a:bodyPr/>
-          <a:lstStyle/>
-          <a:p>
-            <a:pPr defTabSz="566674">
-              <a:defRPr sz="7372">
-                <a:effectLst>
-                  <a:outerShdw sx="100000" sy="100000" kx="0" ky="0" algn="b" rotWithShape="0" blurRad="24638" dist="24638" dir="16200000">
-                    <a:srgbClr val="000000">
-                      <a:alpha val="34000"/>
-                    </a:srgbClr>
-                  </a:outerShdw>
-                </a:effectLst>
-              </a:defRPr>
-            </a:pPr>
-          </a:p>
-        </p:txBody>
-      </p:sp>
-      <p:sp>
-        <p:nvSpPr>
-          <p:cNvPr id="125" name="Shape 125"/>
-          <p:cNvSpPr/>
-          <p:nvPr>
-            <p:ph type="body" sz="quarter" idx="1"/>
-          </p:nvPr>
-        </p:nvSpPr>
-        <p:spPr>
-          <a:prstGeom prst="rect">
-            <a:avLst/>
-          </a:prstGeom>
-        </p:spPr>
-        <p:txBody>
-          <a:bodyPr/>
-          <a:lstStyle/>
-          <a:p>
-            <a:pPr/>
-          </a:p>
-        </p:txBody>
-      </p:sp>
     </p:spTree>
   </p:cSld>
   <p:clrMapOvr>
@@ -3811,31 +3754,31 @@
       </p:grpSpPr>
       <p:pic>
         <p:nvPicPr>
-          <p:cNvPr id="127" name="Architecture.png"/>
+          <p:cNvPr id="125" name="image6.png"/>
           <p:cNvPicPr>
             <a:picLocks noChangeAspect="1"/>
           </p:cNvPicPr>
-          <p:nvPr>
-            <p:ph type="pic" idx="13"/>
-          </p:nvPr>
+          <p:nvPr/>
         </p:nvPicPr>
         <p:blipFill>
           <a:blip r:embed="rId2">
             <a:extLst/>
           </a:blip>
-          <a:srcRect l="585" t="0" r="585" b="0"/>
           <a:stretch>
             <a:fillRect/>
           </a:stretch>
         </p:blipFill>
         <p:spPr>
           <a:xfrm>
-            <a:off x="-432362" y="-990638"/>
-            <a:ext cx="13869630" cy="10402224"/>
+            <a:off x="685940" y="1238503"/>
+            <a:ext cx="11632919" cy="7276594"/>
           </a:xfrm>
           <a:prstGeom prst="rect">
             <a:avLst/>
           </a:prstGeom>
+          <a:ln w="12700">
+            <a:miter lim="400000"/>
+          </a:ln>
         </p:spPr>
       </p:pic>
     </p:spTree>
@@ -3866,7 +3809,7 @@
       </p:grpSpPr>
       <p:pic>
         <p:nvPicPr>
-          <p:cNvPr id="129" name="use_case_diagram.png"/>
+          <p:cNvPr id="127" name="image7.png"/>
           <p:cNvPicPr>
             <a:picLocks noChangeAspect="1"/>
           </p:cNvPicPr>
@@ -3882,8 +3825,8 @@
         </p:blipFill>
         <p:spPr>
           <a:xfrm>
-            <a:off x="685941" y="1238504"/>
-            <a:ext cx="11632918" cy="7276592"/>
+            <a:off x="757555" y="2908912"/>
+            <a:ext cx="11489689" cy="3898288"/>
           </a:xfrm>
           <a:prstGeom prst="rect">
             <a:avLst/>
@@ -3921,7 +3864,7 @@
       </p:grpSpPr>
       <p:pic>
         <p:nvPicPr>
-          <p:cNvPr id="131" name="packages.png"/>
+          <p:cNvPr id="129" name="image8.png"/>
           <p:cNvPicPr>
             <a:picLocks noChangeAspect="1"/>
           </p:cNvPicPr>
@@ -3937,8 +3880,8 @@
         </p:blipFill>
         <p:spPr>
           <a:xfrm>
-            <a:off x="757556" y="2908913"/>
-            <a:ext cx="11489688" cy="3898287"/>
+            <a:off x="663961" y="1874485"/>
+            <a:ext cx="11676877" cy="5737694"/>
           </a:xfrm>
           <a:prstGeom prst="rect">
             <a:avLst/>
@@ -3976,31 +3919,31 @@
       </p:grpSpPr>
       <p:pic>
         <p:nvPicPr>
-          <p:cNvPr id="133" name="controllers.png"/>
+          <p:cNvPr id="131" name="erdplus-diagram.png"/>
           <p:cNvPicPr>
             <a:picLocks noChangeAspect="1"/>
           </p:cNvPicPr>
-          <p:nvPr/>
+          <p:nvPr>
+            <p:ph type="pic" idx="13"/>
+          </p:nvPr>
         </p:nvPicPr>
         <p:blipFill>
           <a:blip r:embed="rId2">
             <a:extLst/>
           </a:blip>
+          <a:srcRect l="3874" t="0" r="3874" b="0"/>
           <a:stretch>
             <a:fillRect/>
           </a:stretch>
         </p:blipFill>
         <p:spPr>
           <a:xfrm>
-            <a:off x="663962" y="1874485"/>
-            <a:ext cx="11676876" cy="5737693"/>
+            <a:off x="681235" y="510976"/>
+            <a:ext cx="11642359" cy="8731770"/>
           </a:xfrm>
           <a:prstGeom prst="rect">
             <a:avLst/>
           </a:prstGeom>
-          <a:ln w="12700">
-            <a:miter lim="400000"/>
-          </a:ln>
         </p:spPr>
       </p:pic>
     </p:spTree>
@@ -4017,18 +3960,16 @@
   <a:themeElements>
     <a:clrScheme name="Moroccan">
       <a:dk1>
-        <a:srgbClr val="073E86"/>
+        <a:srgbClr val="86837F"/>
       </a:dk1>
       <a:lt1>
-        <a:srgbClr val="86837F">
-          <a:alpha val="80000"/>
-        </a:srgbClr>
+        <a:srgbClr val="073E86"/>
       </a:lt1>
       <a:dk2>
-        <a:srgbClr val="586770"/>
+        <a:srgbClr val="A7A7A7"/>
       </a:dk2>
       <a:lt2>
-        <a:srgbClr val="C4CBD0"/>
+        <a:srgbClr val="535353"/>
       </a:lt2>
       <a:accent1>
         <a:srgbClr val="61A4C7"/>
@@ -4057,14 +3998,14 @@
     </a:clrScheme>
     <a:fontScheme name="Moroccan">
       <a:majorFont>
-        <a:latin typeface="Hoefler Text"/>
-        <a:ea typeface="Hoefler Text"/>
-        <a:cs typeface="Hoefler Text"/>
+        <a:latin typeface="Helvetica Neue"/>
+        <a:ea typeface="Helvetica Neue"/>
+        <a:cs typeface="Helvetica Neue"/>
       </a:majorFont>
       <a:minorFont>
-        <a:latin typeface="Hoefler Text"/>
-        <a:ea typeface="Hoefler Text"/>
-        <a:cs typeface="Hoefler Text"/>
+        <a:latin typeface="Helvetica"/>
+        <a:ea typeface="Helvetica"/>
+        <a:cs typeface="Helvetica"/>
       </a:minorFont>
     </a:fontScheme>
     <a:fmtScheme name="Moroccan">
@@ -4204,14 +4145,15 @@
   <a:objectDefaults>
     <a:spDef>
       <a:spPr>
-        <a:blipFill rotWithShape="1">
-          <a:blip r:embed="rId1"/>
-          <a:srcRect l="0" t="0" r="0" b="0"/>
-          <a:tile tx="0" ty="0" sx="100000" sy="100000" flip="none" algn="tl"/>
-        </a:blipFill>
-        <a:ln w="12700" cap="flat">
-          <a:noFill/>
-          <a:miter lim="400000"/>
+        <a:solidFill>
+          <a:srgbClr val="86837F"/>
+        </a:solidFill>
+        <a:ln w="25400" cap="flat">
+          <a:solidFill>
+            <a:schemeClr val="accent1"/>
+          </a:solidFill>
+          <a:prstDash val="solid"/>
+          <a:round/>
         </a:ln>
         <a:effectLst/>
         <a:sp3d/>
@@ -4235,18 +4177,22 @@
           <a:buFontTx/>
           <a:buNone/>
           <a:tabLst/>
-          <a:defRPr b="0" baseline="0" cap="none" i="0" spc="0" strike="noStrike" sz="3200" u="none" kumimoji="0" normalizeH="0">
+          <a:defRPr b="0" baseline="0" cap="none" i="1" spc="0" strike="noStrike" sz="4000" u="none" kumimoji="0" normalizeH="0">
             <a:ln>
               <a:noFill/>
             </a:ln>
             <a:solidFill>
-              <a:srgbClr val="F3F1DF"/>
+              <a:srgbClr val="073E86"/>
             </a:solidFill>
-            <a:effectLst/>
+            <a:effectLst>
+              <a:outerShdw sx="100000" sy="100000" kx="0" ky="0" algn="b" rotWithShape="0" blurRad="25400" dist="12700" dir="5400000">
+                <a:srgbClr val="FFFFFF"/>
+              </a:outerShdw>
+            </a:effectLst>
             <a:uFillTx/>
-            <a:latin typeface="+mn-lt"/>
-            <a:ea typeface="+mn-ea"/>
-            <a:cs typeface="+mn-cs"/>
+            <a:latin typeface="Hoefler Text"/>
+            <a:ea typeface="Hoefler Text"/>
+            <a:cs typeface="Hoefler Text"/>
             <a:sym typeface="Hoefler Text"/>
           </a:defRPr>
         </a:defPPr>
@@ -4495,15 +4441,12 @@
     <a:lnDef>
       <a:spPr>
         <a:noFill/>
-        <a:ln w="38100" cap="flat">
+        <a:ln w="25400" cap="flat">
           <a:solidFill>
-            <a:schemeClr val="accent1">
-              <a:satOff val="-17010"/>
-              <a:lumOff val="14363"/>
-            </a:schemeClr>
+            <a:schemeClr val="accent1"/>
           </a:solidFill>
           <a:prstDash val="solid"/>
-          <a:miter lim="400000"/>
+          <a:round/>
         </a:ln>
         <a:effectLst/>
         <a:sp3d/>
@@ -4814,9 +4757,7 @@
               <a:noFill/>
             </a:ln>
             <a:solidFill>
-              <a:srgbClr val="86837F">
-                <a:alpha val="80000"/>
-              </a:srgbClr>
+              <a:srgbClr val="073E86"/>
             </a:solidFill>
             <a:effectLst>
               <a:outerShdw sx="100000" sy="100000" kx="0" ky="0" algn="b" rotWithShape="0" blurRad="25400" dist="12700" dir="5400000">
@@ -4824,9 +4765,9 @@
               </a:outerShdw>
             </a:effectLst>
             <a:uFillTx/>
-            <a:latin typeface="+mn-lt"/>
-            <a:ea typeface="+mn-ea"/>
-            <a:cs typeface="+mn-cs"/>
+            <a:latin typeface="Hoefler Text"/>
+            <a:ea typeface="Hoefler Text"/>
+            <a:cs typeface="Hoefler Text"/>
             <a:sym typeface="Hoefler Text"/>
           </a:defRPr>
         </a:defPPr>
@@ -5087,10 +5028,10 @@
         <a:srgbClr val="FFFFFF"/>
       </a:lt1>
       <a:dk2>
-        <a:srgbClr val="586770"/>
+        <a:srgbClr val="A7A7A7"/>
       </a:dk2>
       <a:lt2>
-        <a:srgbClr val="C4CBD0"/>
+        <a:srgbClr val="535353"/>
       </a:lt2>
       <a:accent1>
         <a:srgbClr val="61A4C7"/>
@@ -5119,14 +5060,14 @@
     </a:clrScheme>
     <a:fontScheme name="Moroccan">
       <a:majorFont>
-        <a:latin typeface="Hoefler Text"/>
-        <a:ea typeface="Hoefler Text"/>
-        <a:cs typeface="Hoefler Text"/>
+        <a:latin typeface="Helvetica Neue"/>
+        <a:ea typeface="Helvetica Neue"/>
+        <a:cs typeface="Helvetica Neue"/>
       </a:majorFont>
       <a:minorFont>
-        <a:latin typeface="Hoefler Text"/>
-        <a:ea typeface="Hoefler Text"/>
-        <a:cs typeface="Hoefler Text"/>
+        <a:latin typeface="Helvetica"/>
+        <a:ea typeface="Helvetica"/>
+        <a:cs typeface="Helvetica"/>
       </a:minorFont>
     </a:fontScheme>
     <a:fmtScheme name="Moroccan">
@@ -5266,14 +5207,15 @@
   <a:objectDefaults>
     <a:spDef>
       <a:spPr>
-        <a:blipFill rotWithShape="1">
-          <a:blip r:embed="rId1"/>
-          <a:srcRect l="0" t="0" r="0" b="0"/>
-          <a:tile tx="0" ty="0" sx="100000" sy="100000" flip="none" algn="tl"/>
-        </a:blipFill>
-        <a:ln w="12700" cap="flat">
-          <a:noFill/>
-          <a:miter lim="400000"/>
+        <a:solidFill>
+          <a:srgbClr val="86837F"/>
+        </a:solidFill>
+        <a:ln w="25400" cap="flat">
+          <a:solidFill>
+            <a:schemeClr val="accent1"/>
+          </a:solidFill>
+          <a:prstDash val="solid"/>
+          <a:round/>
         </a:ln>
         <a:effectLst/>
         <a:sp3d/>
@@ -5297,18 +5239,22 @@
           <a:buFontTx/>
           <a:buNone/>
           <a:tabLst/>
-          <a:defRPr b="0" baseline="0" cap="none" i="0" spc="0" strike="noStrike" sz="3200" u="none" kumimoji="0" normalizeH="0">
+          <a:defRPr b="0" baseline="0" cap="none" i="1" spc="0" strike="noStrike" sz="4000" u="none" kumimoji="0" normalizeH="0">
             <a:ln>
               <a:noFill/>
             </a:ln>
             <a:solidFill>
-              <a:srgbClr val="F3F1DF"/>
+              <a:srgbClr val="073E86"/>
             </a:solidFill>
-            <a:effectLst/>
+            <a:effectLst>
+              <a:outerShdw sx="100000" sy="100000" kx="0" ky="0" algn="b" rotWithShape="0" blurRad="25400" dist="12700" dir="5400000">
+                <a:srgbClr val="FFFFFF"/>
+              </a:outerShdw>
+            </a:effectLst>
             <a:uFillTx/>
-            <a:latin typeface="+mn-lt"/>
-            <a:ea typeface="+mn-ea"/>
-            <a:cs typeface="+mn-cs"/>
+            <a:latin typeface="Hoefler Text"/>
+            <a:ea typeface="Hoefler Text"/>
+            <a:cs typeface="Hoefler Text"/>
             <a:sym typeface="Hoefler Text"/>
           </a:defRPr>
         </a:defPPr>
@@ -5557,15 +5503,12 @@
     <a:lnDef>
       <a:spPr>
         <a:noFill/>
-        <a:ln w="38100" cap="flat">
+        <a:ln w="25400" cap="flat">
           <a:solidFill>
-            <a:schemeClr val="accent1">
-              <a:satOff val="-17010"/>
-              <a:lumOff val="14363"/>
-            </a:schemeClr>
+            <a:schemeClr val="accent1"/>
           </a:solidFill>
           <a:prstDash val="solid"/>
-          <a:miter lim="400000"/>
+          <a:round/>
         </a:ln>
         <a:effectLst/>
         <a:sp3d/>
@@ -5876,9 +5819,7 @@
               <a:noFill/>
             </a:ln>
             <a:solidFill>
-              <a:srgbClr val="86837F">
-                <a:alpha val="80000"/>
-              </a:srgbClr>
+              <a:srgbClr val="073E86"/>
             </a:solidFill>
             <a:effectLst>
               <a:outerShdw sx="100000" sy="100000" kx="0" ky="0" algn="b" rotWithShape="0" blurRad="25400" dist="12700" dir="5400000">
@@ -5886,9 +5827,9 @@
               </a:outerShdw>
             </a:effectLst>
             <a:uFillTx/>
-            <a:latin typeface="+mn-lt"/>
-            <a:ea typeface="+mn-ea"/>
-            <a:cs typeface="+mn-cs"/>
+            <a:latin typeface="Hoefler Text"/>
+            <a:ea typeface="Hoefler Text"/>
+            <a:cs typeface="Hoefler Text"/>
             <a:sym typeface="Hoefler Text"/>
           </a:defRPr>
         </a:defPPr>

</xml_diff>